<commit_message>
CSS -> SASS and LESS lectures and demos
</commit_message>
<xml_diff>
--- a/5. CSS/Lectures/4. SASS.pptx
+++ b/5. CSS/Lectures/4. SASS.pptx
@@ -33,8 +33,8 @@
     <p:sldId id="285" r:id="rId27"/>
     <p:sldId id="284" r:id="rId28"/>
     <p:sldId id="259" r:id="rId29"/>
-    <p:sldId id="279" r:id="rId30"/>
-    <p:sldId id="282" r:id="rId31"/>
+    <p:sldId id="286" r:id="rId30"/>
+    <p:sldId id="287" r:id="rId31"/>
   </p:sldIdLst>
   <p:sldSz cx="9144000" cy="6858000" type="screen4x3"/>
   <p:notesSz cx="6858000" cy="9144000"/>
@@ -5120,132 +5120,6 @@
           </a:p>
         </p:txBody>
       </p:sp>
-      <p:sp>
-        <p:nvSpPr>
-          <p:cNvPr id="6" name="Text Placeholder 5"/>
-          <p:cNvSpPr>
-            <a:spLocks noGrp="1"/>
-          </p:cNvSpPr>
-          <p:nvPr>
-            <p:ph type="body" sz="quarter" idx="10"/>
-          </p:nvPr>
-        </p:nvSpPr>
-        <p:spPr/>
-        <p:txBody>
-          <a:bodyPr/>
-          <a:lstStyle/>
-          <a:p>
-            <a:r>
-              <a:rPr lang="en-US" dirty="0" smtClean="0"/>
-              <a:t>Doncho Minkov</a:t>
-            </a:r>
-            <a:endParaRPr lang="en-US" dirty="0"/>
-          </a:p>
-        </p:txBody>
-      </p:sp>
-      <p:sp>
-        <p:nvSpPr>
-          <p:cNvPr id="7" name="Text Placeholder 6"/>
-          <p:cNvSpPr>
-            <a:spLocks noGrp="1"/>
-          </p:cNvSpPr>
-          <p:nvPr>
-            <p:ph type="body" sz="quarter" idx="11"/>
-          </p:nvPr>
-        </p:nvSpPr>
-        <p:spPr/>
-        <p:txBody>
-          <a:bodyPr/>
-          <a:lstStyle/>
-          <a:p>
-            <a:r>
-              <a:rPr lang="en-US" dirty="0" smtClean="0"/>
-              <a:t>Telerik Software Academy</a:t>
-            </a:r>
-            <a:endParaRPr lang="en-US" dirty="0"/>
-          </a:p>
-        </p:txBody>
-      </p:sp>
-      <p:sp>
-        <p:nvSpPr>
-          <p:cNvPr id="8" name="Text Placeholder 7"/>
-          <p:cNvSpPr>
-            <a:spLocks noGrp="1"/>
-          </p:cNvSpPr>
-          <p:nvPr>
-            <p:ph type="body" sz="quarter" idx="12"/>
-          </p:nvPr>
-        </p:nvSpPr>
-        <p:spPr/>
-        <p:txBody>
-          <a:bodyPr/>
-          <a:lstStyle/>
-          <a:p>
-            <a:r>
-              <a:rPr lang="en-US" dirty="0" smtClean="0">
-                <a:hlinkClick r:id="rId2"/>
-              </a:rPr>
-              <a:t>http://academy.telerik.com</a:t>
-            </a:r>
-            <a:r>
-              <a:rPr lang="en-US" dirty="0"/>
-              <a:t> </a:t>
-            </a:r>
-          </a:p>
-        </p:txBody>
-      </p:sp>
-      <p:sp>
-        <p:nvSpPr>
-          <p:cNvPr id="9" name="Text Placeholder 8"/>
-          <p:cNvSpPr>
-            <a:spLocks noGrp="1"/>
-          </p:cNvSpPr>
-          <p:nvPr>
-            <p:ph type="body" sz="quarter" idx="13"/>
-          </p:nvPr>
-        </p:nvSpPr>
-        <p:spPr/>
-        <p:txBody>
-          <a:bodyPr/>
-          <a:lstStyle/>
-          <a:p>
-            <a:r>
-              <a:rPr lang="en-US" dirty="0" smtClean="0"/>
-              <a:t>Technical Trainer</a:t>
-            </a:r>
-            <a:endParaRPr lang="en-US" dirty="0"/>
-          </a:p>
-        </p:txBody>
-      </p:sp>
-      <p:sp>
-        <p:nvSpPr>
-          <p:cNvPr id="10" name="Text Placeholder 9"/>
-          <p:cNvSpPr>
-            <a:spLocks noGrp="1"/>
-          </p:cNvSpPr>
-          <p:nvPr>
-            <p:ph type="body" sz="quarter" idx="14"/>
-          </p:nvPr>
-        </p:nvSpPr>
-        <p:spPr/>
-        <p:txBody>
-          <a:bodyPr/>
-          <a:lstStyle/>
-          <a:p>
-            <a:r>
-              <a:rPr lang="en-US" dirty="0" smtClean="0">
-                <a:hlinkClick r:id="rId3"/>
-              </a:rPr>
-              <a:t>http://minkov.it</a:t>
-            </a:r>
-            <a:r>
-              <a:rPr lang="en-US" dirty="0" smtClean="0"/>
-              <a:t> </a:t>
-            </a:r>
-            <a:endParaRPr lang="en-US" dirty="0"/>
-          </a:p>
-        </p:txBody>
-      </p:sp>
       <p:pic>
         <p:nvPicPr>
           <p:cNvPr id="1026" name="Picture 2" descr="http://upload.wikimedia.org/wikipedia/en/c/cb/Sass_Logo.gif"/>
@@ -5255,7 +5129,7 @@
           <p:nvPr/>
         </p:nvPicPr>
         <p:blipFill>
-          <a:blip r:embed="rId4" cstate="screen">
+          <a:blip r:embed="rId2" cstate="screen">
             <a:extLst>
               <a:ext uri="{28A0092B-C50C-407E-A947-70E740481C1C}">
                 <a14:useLocalDpi xmlns:a14="http://schemas.microsoft.com/office/drawing/2010/main"/>
@@ -5298,7 +5172,7 @@
           <p:nvPr/>
         </p:nvPicPr>
         <p:blipFill rotWithShape="1">
-          <a:blip r:embed="rId5" cstate="screen">
+          <a:blip r:embed="rId3" cstate="screen">
             <a:extLst>
               <a:ext uri="{28A0092B-C50C-407E-A947-70E740481C1C}">
                 <a14:useLocalDpi xmlns:a14="http://schemas.microsoft.com/office/drawing/2010/main"/>
@@ -5324,6 +5198,70 @@
           <a:effectLst>
             <a:softEdge rad="317500"/>
           </a:effectLst>
+        </p:spPr>
+      </p:pic>
+      <p:pic>
+        <p:nvPicPr>
+          <p:cNvPr id="19" name="Picture 18"/>
+          <p:cNvPicPr>
+            <a:picLocks noChangeAspect="1" noChangeArrowheads="1"/>
+          </p:cNvPicPr>
+          <p:nvPr/>
+        </p:nvPicPr>
+        <p:blipFill>
+          <a:blip r:embed="rId4">
+            <a:extLst>
+              <a:ext uri="{28A0092B-C50C-407E-A947-70E740481C1C}">
+                <a14:useLocalDpi xmlns:a14="http://schemas.microsoft.com/office/drawing/2010/main" val="0"/>
+              </a:ext>
+            </a:extLst>
+          </a:blip>
+          <a:srcRect/>
+          <a:stretch>
+            <a:fillRect/>
+          </a:stretch>
+        </p:blipFill>
+        <p:spPr bwMode="auto">
+          <a:xfrm>
+            <a:off x="315966" y="5083206"/>
+            <a:ext cx="4090987" cy="1219200"/>
+          </a:xfrm>
+          <a:prstGeom prst="rect">
+            <a:avLst/>
+          </a:prstGeom>
+          <a:noFill/>
+          <a:ln>
+            <a:noFill/>
+          </a:ln>
+          <a:effectLst/>
+          <a:extLst>
+            <a:ext uri="{909E8E84-426E-40DD-AFC4-6F175D3DCCD1}">
+              <a14:hiddenFill xmlns:a14="http://schemas.microsoft.com/office/drawing/2010/main">
+                <a:solidFill>
+                  <a:schemeClr val="accent1"/>
+                </a:solidFill>
+              </a14:hiddenFill>
+            </a:ext>
+            <a:ext uri="{91240B29-F687-4F45-9708-019B960494DF}">
+              <a14:hiddenLine xmlns:a14="http://schemas.microsoft.com/office/drawing/2010/main" w="9525">
+                <a:solidFill>
+                  <a:schemeClr val="tx1"/>
+                </a:solidFill>
+                <a:miter lim="800000"/>
+                <a:headEnd/>
+                <a:tailEnd/>
+              </a14:hiddenLine>
+            </a:ext>
+            <a:ext uri="{AF507438-7753-43E0-B8FC-AC1667EBCBE1}">
+              <a14:hiddenEffects xmlns:a14="http://schemas.microsoft.com/office/drawing/2010/main">
+                <a:effectLst>
+                  <a:outerShdw dist="35921" dir="2700000" algn="ctr" rotWithShape="0">
+                    <a:schemeClr val="bg2"/>
+                  </a:outerShdw>
+                </a:effectLst>
+              </a14:hiddenEffects>
+            </a:ext>
+          </a:extLst>
         </p:spPr>
       </p:pic>
     </p:spTree>
@@ -9013,15 +8951,7 @@
           <a:effectLst>
             <a:softEdge rad="63500"/>
           </a:effectLst>
-          <a:extLst>
-            <a:ext uri="{909E8E84-426E-40DD-AFC4-6F175D3DCCD1}">
-              <a14:hiddenFill xmlns:a14="http://schemas.microsoft.com/office/drawing/2010/main">
-                <a:solidFill>
-                  <a:srgbClr val="FFFFFF"/>
-                </a:solidFill>
-              </a14:hiddenFill>
-            </a:ext>
-          </a:extLst>
+          <a:extLst/>
         </p:spPr>
       </p:pic>
     </p:spTree>
@@ -10858,25 +10788,15 @@
           <a:p>
             <a:r>
               <a:rPr lang="en-US" dirty="0" smtClean="0"/>
-              <a:t>Working with </a:t>
-            </a:r>
+              <a:t>Working with SASS</a:t>
+            </a:r>
+          </a:p>
+          <a:p>
+            <a:pPr lvl="1"/>
             <a:r>
               <a:rPr lang="en-US" dirty="0" smtClean="0"/>
-              <a:t>SASS</a:t>
-            </a:r>
-            <a:endParaRPr lang="en-US" dirty="0" smtClean="0"/>
-          </a:p>
-          <a:p>
-            <a:pPr lvl="1"/>
-            <a:r>
-              <a:rPr lang="en-US" dirty="0" smtClean="0"/>
-              <a:t>Using </a:t>
-            </a:r>
-            <a:r>
-              <a:rPr lang="en-US" dirty="0" smtClean="0"/>
-              <a:t>Ruby Console</a:t>
-            </a:r>
-            <a:endParaRPr lang="en-US" dirty="0" smtClean="0"/>
+              <a:t>Using Ruby Console</a:t>
+            </a:r>
           </a:p>
           <a:p>
             <a:pPr lvl="1"/>
@@ -11044,15 +10964,7 @@
           <a:effectLst>
             <a:softEdge rad="63500"/>
           </a:effectLst>
-          <a:extLst>
-            <a:ext uri="{909E8E84-426E-40DD-AFC4-6F175D3DCCD1}">
-              <a14:hiddenFill xmlns:a14="http://schemas.microsoft.com/office/drawing/2010/main">
-                <a:solidFill>
-                  <a:srgbClr val="FFFFFF"/>
-                </a:solidFill>
-              </a14:hiddenFill>
-            </a:ext>
-          </a:extLst>
+          <a:extLst/>
         </p:spPr>
       </p:pic>
     </p:spTree>
@@ -12063,15 +11975,7 @@
           <a:effectLst>
             <a:softEdge rad="63500"/>
           </a:effectLst>
-          <a:extLst>
-            <a:ext uri="{909E8E84-426E-40DD-AFC4-6F175D3DCCD1}">
-              <a14:hiddenFill xmlns:a14="http://schemas.microsoft.com/office/drawing/2010/main">
-                <a:solidFill>
-                  <a:srgbClr val="FFFFFF"/>
-                </a:solidFill>
-              </a14:hiddenFill>
-            </a:ext>
-          </a:extLst>
+          <a:extLst/>
         </p:spPr>
       </p:pic>
     </p:spTree>
@@ -13871,15 +13775,7 @@
           <a:effectLst>
             <a:softEdge rad="63500"/>
           </a:effectLst>
-          <a:extLst>
-            <a:ext uri="{909E8E84-426E-40DD-AFC4-6F175D3DCCD1}">
-              <a14:hiddenFill xmlns:a14="http://schemas.microsoft.com/office/drawing/2010/main">
-                <a:solidFill>
-                  <a:srgbClr val="FFFFFF"/>
-                </a:solidFill>
-              </a14:hiddenFill>
-            </a:ext>
-          </a:extLst>
+          <a:extLst/>
         </p:spPr>
       </p:pic>
     </p:spTree>
@@ -14566,44 +14462,118 @@
           <a:lstStyle/>
           <a:p>
             <a:pPr marL="347663" indent="-347663">
+              <a:lnSpc>
+                <a:spcPct val="100000"/>
+              </a:lnSpc>
               <a:buFont typeface="+mj-lt"/>
               <a:buAutoNum type="arabicPeriod"/>
             </a:pPr>
             <a:r>
-              <a:rPr lang="en-US" dirty="0" smtClean="0"/>
-              <a:t>Implement the following using SASS</a:t>
-            </a:r>
-          </a:p>
-          <a:p>
-            <a:pPr lvl="1"/>
-            <a:r>
-              <a:rPr lang="en-US" dirty="0" smtClean="0"/>
+              <a:rPr lang="en-US" sz="2800" dirty="0" smtClean="0"/>
+              <a:t>Implement the following </a:t>
+            </a:r>
+            <a:r>
+              <a:rPr lang="en-US" sz="2800" dirty="0" smtClean="0"/>
+              <a:t>using either </a:t>
+            </a:r>
+            <a:r>
+              <a:rPr lang="en-US" sz="2800" dirty="0" smtClean="0"/>
+              <a:t>LESS or SASS</a:t>
+            </a:r>
+          </a:p>
+          <a:p>
+            <a:pPr lvl="1">
+              <a:lnSpc>
+                <a:spcPct val="100000"/>
+              </a:lnSpc>
+            </a:pPr>
+            <a:r>
+              <a:rPr lang="en-US" sz="2600" dirty="0" smtClean="0"/>
               <a:t>Use the HTML code from homework.html</a:t>
             </a:r>
           </a:p>
           <a:p>
-            <a:pPr lvl="2"/>
-            <a:r>
-              <a:rPr lang="en-US" dirty="0" smtClean="0"/>
-              <a:t>Create the SASS easy to change (backgrounds, fonts)</a:t>
-            </a:r>
-          </a:p>
-          <a:p>
-            <a:pPr lvl="2"/>
-            <a:r>
-              <a:rPr lang="en-US" dirty="0" smtClean="0"/>
+            <a:pPr lvl="2">
+              <a:lnSpc>
+                <a:spcPct val="100000"/>
+              </a:lnSpc>
+            </a:pPr>
+            <a:r>
+              <a:rPr lang="en-US" sz="2400" dirty="0" smtClean="0"/>
+              <a:t>Create the LESS/SASS easy to change </a:t>
+            </a:r>
+            <a:r>
+              <a:rPr lang="en-US" sz="2400" dirty="0" smtClean="0"/>
+              <a:t>(colors, </a:t>
+            </a:r>
+            <a:r>
+              <a:rPr lang="en-US" sz="2400" dirty="0" smtClean="0"/>
+              <a:t>fonts)</a:t>
+            </a:r>
+          </a:p>
+          <a:p>
+            <a:pPr lvl="2">
+              <a:lnSpc>
+                <a:spcPct val="100000"/>
+              </a:lnSpc>
+            </a:pPr>
+            <a:r>
+              <a:rPr lang="en-US" sz="2400" dirty="0" smtClean="0"/>
               <a:t>Use </a:t>
             </a:r>
             <a:r>
-              <a:rPr lang="en-US" dirty="0" err="1" smtClean="0"/>
+              <a:rPr lang="en-US" sz="2400" dirty="0" err="1" smtClean="0"/>
               <a:t>mixins</a:t>
             </a:r>
             <a:r>
-              <a:rPr lang="en-US" dirty="0" smtClean="0"/>
-              <a:t> for clears, gradients)</a:t>
-            </a:r>
-          </a:p>
-          <a:p>
+              <a:rPr lang="en-US" sz="2400" dirty="0" smtClean="0"/>
+              <a:t> for clears, gradients</a:t>
+            </a:r>
+            <a:r>
+              <a:rPr lang="en-US" sz="2400" dirty="0" smtClean="0"/>
+              <a:t>)</a:t>
+            </a:r>
+          </a:p>
+          <a:p>
+            <a:pPr lvl="2">
+              <a:lnSpc>
+                <a:spcPct val="100000"/>
+              </a:lnSpc>
+            </a:pPr>
+            <a:r>
+              <a:rPr lang="en-US" sz="2400" dirty="0" smtClean="0"/>
+              <a:t>Source can be found </a:t>
+            </a:r>
+            <a:r>
+              <a:rPr lang="en-US" sz="2400" dirty="0"/>
+              <a:t>in </a:t>
+            </a:r>
+            <a:r>
+              <a:rPr lang="en-US" sz="2400" dirty="0">
+                <a:solidFill>
+                  <a:schemeClr val="accent5">
+                    <a:lumMod val="20000"/>
+                    <a:lumOff val="80000"/>
+                  </a:schemeClr>
+                </a:solidFill>
+              </a:rPr>
+              <a:t>Preprocessors-homework.zip</a:t>
+            </a:r>
+            <a:endParaRPr lang="en-US" sz="2400" dirty="0" smtClean="0">
+              <a:solidFill>
+                <a:schemeClr val="accent5">
+                  <a:lumMod val="20000"/>
+                  <a:lumOff val="80000"/>
+                </a:schemeClr>
+              </a:solidFill>
+            </a:endParaRPr>
+          </a:p>
+          <a:p>
+            <a:pPr>
+              <a:lnSpc>
+                <a:spcPct val="100000"/>
+              </a:lnSpc>
+            </a:pPr>
             <a:endParaRPr lang="en-US" dirty="0"/>
           </a:p>
         </p:txBody>
@@ -14630,7 +14600,7 @@
         </p:blipFill>
         <p:spPr>
           <a:xfrm>
-            <a:off x="2282342" y="3810000"/>
+            <a:off x="2358542" y="3595878"/>
             <a:ext cx="4426916" cy="2766822"/>
           </a:xfrm>
           <a:prstGeom prst="rect">
@@ -14641,7 +14611,7 @@
     </p:spTree>
     <p:extLst>
       <p:ext uri="{BB962C8B-B14F-4D97-AF65-F5344CB8AC3E}">
-        <p14:creationId xmlns:p14="http://schemas.microsoft.com/office/powerpoint/2010/main" val="1739166483"/>
+        <p14:creationId xmlns:p14="http://schemas.microsoft.com/office/powerpoint/2010/main" val="4245754203"/>
       </p:ext>
     </p:extLst>
   </p:cSld>
@@ -14844,42 +14814,63 @@
           <a:lstStyle/>
           <a:p>
             <a:pPr marL="347663" indent="-347663">
+              <a:lnSpc>
+                <a:spcPct val="100000"/>
+              </a:lnSpc>
               <a:buFont typeface="+mj-lt"/>
               <a:buAutoNum type="arabicPeriod" startAt="2"/>
             </a:pPr>
             <a:r>
-              <a:rPr lang="en-US" dirty="0" smtClean="0"/>
+              <a:rPr lang="en-US" sz="3000" dirty="0" smtClean="0"/>
               <a:t>Create a web gallery</a:t>
             </a:r>
           </a:p>
           <a:p>
-            <a:pPr marL="804863" lvl="1" indent="-457200"/>
-            <a:r>
-              <a:rPr lang="en-US" dirty="0" smtClean="0"/>
+            <a:pPr marL="804863" lvl="1" indent="-457200">
+              <a:lnSpc>
+                <a:spcPct val="100000"/>
+              </a:lnSpc>
+            </a:pPr>
+            <a:r>
+              <a:rPr lang="en-US" sz="2800" dirty="0" smtClean="0"/>
               <a:t>Use </a:t>
             </a:r>
             <a:r>
-              <a:rPr lang="en-US" dirty="0"/>
-              <a:t>only HTML, SASS and CSS</a:t>
-            </a:r>
-          </a:p>
-          <a:p>
-            <a:pPr marL="804863" lvl="1" indent="-457200"/>
-            <a:r>
-              <a:rPr lang="en-US" dirty="0" smtClean="0"/>
+              <a:rPr lang="en-US" sz="2800" dirty="0"/>
+              <a:t>only HTML, </a:t>
+            </a:r>
+            <a:r>
+              <a:rPr lang="en-US" sz="2800" dirty="0" smtClean="0"/>
+              <a:t>LESS or SASS</a:t>
+            </a:r>
+            <a:endParaRPr lang="en-US" sz="2800" dirty="0"/>
+          </a:p>
+          <a:p>
+            <a:pPr marL="804863" lvl="1" indent="-457200">
+              <a:lnSpc>
+                <a:spcPct val="100000"/>
+              </a:lnSpc>
+            </a:pPr>
+            <a:r>
+              <a:rPr lang="en-US" sz="2800" dirty="0" smtClean="0"/>
               <a:t>List images</a:t>
             </a:r>
           </a:p>
           <a:p>
-            <a:pPr marL="804863" lvl="1" indent="-457200"/>
-            <a:r>
-              <a:rPr lang="en-US" dirty="0" smtClean="0"/>
-              <a:t>When a image is selected, show it zoomed</a:t>
-            </a:r>
-          </a:p>
-          <a:p>
-            <a:pPr marL="804863" lvl="1" indent="-457200"/>
-            <a:endParaRPr lang="en-US" dirty="0"/>
+            <a:pPr marL="804863" lvl="1" indent="-457200">
+              <a:lnSpc>
+                <a:spcPct val="100000"/>
+              </a:lnSpc>
+            </a:pPr>
+            <a:r>
+              <a:rPr lang="en-US" sz="2800" dirty="0" smtClean="0"/>
+              <a:t>When a image is selected, show it </a:t>
+            </a:r>
+            <a:r>
+              <a:rPr lang="en-US" sz="2800" dirty="0" smtClean="0"/>
+              <a:t>zoomed</a:t>
+            </a:r>
+            <a:endParaRPr lang="en-US" sz="2800" dirty="0"/>
           </a:p>
         </p:txBody>
       </p:sp>
@@ -14905,7 +14896,7 @@
         </p:blipFill>
         <p:spPr>
           <a:xfrm>
-            <a:off x="2616327" y="3462496"/>
+            <a:off x="2846451" y="3300571"/>
             <a:ext cx="3451098" cy="3025372"/>
           </a:xfrm>
           <a:prstGeom prst="rect">
@@ -14916,7 +14907,7 @@
     </p:spTree>
     <p:extLst>
       <p:ext uri="{BB962C8B-B14F-4D97-AF65-F5344CB8AC3E}">
-        <p14:creationId xmlns:p14="http://schemas.microsoft.com/office/powerpoint/2010/main" val="3701625545"/>
+        <p14:creationId xmlns:p14="http://schemas.microsoft.com/office/powerpoint/2010/main" val="3557812731"/>
       </p:ext>
     </p:extLst>
   </p:cSld>
@@ -15087,20 +15078,12 @@
               <a:rPr lang="en-US" dirty="0" smtClean="0"/>
               <a:t>Working </a:t>
             </a:r>
-            <a:r>
-              <a:rPr lang="en-US" dirty="0" smtClean="0"/>
-              <a:t/>
-            </a:r>
             <a:br>
               <a:rPr lang="en-US" dirty="0" smtClean="0"/>
             </a:br>
             <a:r>
               <a:rPr lang="en-US" dirty="0" smtClean="0"/>
-              <a:t>with </a:t>
-            </a:r>
-            <a:r>
-              <a:rPr lang="en-US" dirty="0" smtClean="0"/>
-              <a:t>SASS</a:t>
+              <a:t>with SASS</a:t>
             </a:r>
             <a:endParaRPr lang="en-US" dirty="0"/>
           </a:p>
@@ -15255,11 +15238,7 @@
           <a:p>
             <a:r>
               <a:rPr lang="en-US" dirty="0" smtClean="0"/>
-              <a:t>Using </a:t>
-            </a:r>
-            <a:r>
-              <a:rPr lang="en-US" dirty="0" smtClean="0"/>
-              <a:t>Ruby </a:t>
+              <a:t>Using Ruby </a:t>
             </a:r>
             <a:r>
               <a:rPr lang="en-US" dirty="0"/>
@@ -15395,10 +15374,6 @@
               <a:rPr lang="en-US" dirty="0" smtClean="0"/>
               <a:t>Coding SASS </a:t>
             </a:r>
-            <a:r>
-              <a:rPr lang="en-US" dirty="0" smtClean="0"/>
-              <a:t/>
-            </a:r>
             <a:br>
               <a:rPr lang="en-US" dirty="0" smtClean="0"/>
             </a:br>
@@ -15410,7 +15385,6 @@
               <a:rPr lang="en-US" dirty="0"/>
               <a:t>Ruby </a:t>
             </a:r>
-            <a:endParaRPr lang="en-US" dirty="0"/>
           </a:p>
         </p:txBody>
       </p:sp>

</xml_diff>